<commit_message>
lecture 5 and 6 issue solved
</commit_message>
<xml_diff>
--- a/PF-Lecture-06.pptx
+++ b/PF-Lecture-06.pptx
@@ -10,37 +10,36 @@
     <p:sldId id="277" r:id="rId4"/>
     <p:sldId id="278" r:id="rId5"/>
     <p:sldId id="279" r:id="rId6"/>
-    <p:sldId id="280" r:id="rId7"/>
-    <p:sldId id="282" r:id="rId8"/>
-    <p:sldId id="283" r:id="rId9"/>
-    <p:sldId id="281" r:id="rId10"/>
-    <p:sldId id="264" r:id="rId11"/>
+    <p:sldId id="282" r:id="rId7"/>
+    <p:sldId id="283" r:id="rId8"/>
+    <p:sldId id="281" r:id="rId9"/>
+    <p:sldId id="264" r:id="rId10"/>
   </p:sldIdLst>
   <p:sldSz cx="18288000" cy="10287000"/>
   <p:notesSz cx="6858000" cy="9144000"/>
   <p:embeddedFontLst>
     <p:embeddedFont>
       <p:font typeface="Constantia" panose="02030602050306030303" pitchFamily="18" charset="0"/>
-      <p:regular r:id="rId12"/>
-      <p:bold r:id="rId13"/>
-      <p:italic r:id="rId14"/>
-      <p:boldItalic r:id="rId15"/>
+      <p:regular r:id="rId11"/>
+      <p:bold r:id="rId12"/>
+      <p:italic r:id="rId13"/>
+      <p:boldItalic r:id="rId14"/>
     </p:embeddedFont>
     <p:embeddedFont>
       <p:font typeface="Fira Code" pitchFamily="1" charset="0"/>
-      <p:regular r:id="rId16"/>
-      <p:bold r:id="rId17"/>
+      <p:regular r:id="rId15"/>
+      <p:bold r:id="rId16"/>
     </p:embeddedFont>
     <p:embeddedFont>
       <p:font typeface="Lato" panose="020F0502020204030203" pitchFamily="34" charset="0"/>
-      <p:regular r:id="rId18"/>
-      <p:bold r:id="rId19"/>
-      <p:italic r:id="rId20"/>
-      <p:boldItalic r:id="rId21"/>
+      <p:regular r:id="rId17"/>
+      <p:bold r:id="rId18"/>
+      <p:italic r:id="rId19"/>
+      <p:boldItalic r:id="rId20"/>
     </p:embeddedFont>
     <p:embeddedFont>
       <p:font typeface="Lato Bold" panose="020F0502020204030203" charset="0"/>
-      <p:regular r:id="rId22"/>
+      <p:regular r:id="rId21"/>
     </p:embeddedFont>
   </p:embeddedFontLst>
   <p:defaultTextStyle>
@@ -337,7 +336,7 @@
             <a:fld id="{1D8BD707-D9CF-40AE-B4C6-C98DA3205C09}" type="datetimeFigureOut">
               <a:rPr lang="en-US" smtClean="0"/>
               <a:pPr/>
-              <a:t>1/8/2025</a:t>
+              <a:t>1/9/2025</a:t>
             </a:fld>
             <a:endParaRPr lang="en-US"/>
           </a:p>
@@ -502,7 +501,7 @@
             <a:fld id="{1D8BD707-D9CF-40AE-B4C6-C98DA3205C09}" type="datetimeFigureOut">
               <a:rPr lang="en-US" smtClean="0"/>
               <a:pPr/>
-              <a:t>1/8/2025</a:t>
+              <a:t>1/9/2025</a:t>
             </a:fld>
             <a:endParaRPr lang="en-US"/>
           </a:p>
@@ -677,7 +676,7 @@
             <a:fld id="{1D8BD707-D9CF-40AE-B4C6-C98DA3205C09}" type="datetimeFigureOut">
               <a:rPr lang="en-US" smtClean="0"/>
               <a:pPr/>
-              <a:t>1/8/2025</a:t>
+              <a:t>1/9/2025</a:t>
             </a:fld>
             <a:endParaRPr lang="en-US"/>
           </a:p>
@@ -842,7 +841,7 @@
             <a:fld id="{1D8BD707-D9CF-40AE-B4C6-C98DA3205C09}" type="datetimeFigureOut">
               <a:rPr lang="en-US" smtClean="0"/>
               <a:pPr/>
-              <a:t>1/8/2025</a:t>
+              <a:t>1/9/2025</a:t>
             </a:fld>
             <a:endParaRPr lang="en-US"/>
           </a:p>
@@ -1084,7 +1083,7 @@
             <a:fld id="{1D8BD707-D9CF-40AE-B4C6-C98DA3205C09}" type="datetimeFigureOut">
               <a:rPr lang="en-US" smtClean="0"/>
               <a:pPr/>
-              <a:t>1/8/2025</a:t>
+              <a:t>1/9/2025</a:t>
             </a:fld>
             <a:endParaRPr lang="en-US"/>
           </a:p>
@@ -1366,7 +1365,7 @@
             <a:fld id="{1D8BD707-D9CF-40AE-B4C6-C98DA3205C09}" type="datetimeFigureOut">
               <a:rPr lang="en-US" smtClean="0"/>
               <a:pPr/>
-              <a:t>1/8/2025</a:t>
+              <a:t>1/9/2025</a:t>
             </a:fld>
             <a:endParaRPr lang="en-US"/>
           </a:p>
@@ -1782,7 +1781,7 @@
             <a:fld id="{1D8BD707-D9CF-40AE-B4C6-C98DA3205C09}" type="datetimeFigureOut">
               <a:rPr lang="en-US" smtClean="0"/>
               <a:pPr/>
-              <a:t>1/8/2025</a:t>
+              <a:t>1/9/2025</a:t>
             </a:fld>
             <a:endParaRPr lang="en-US"/>
           </a:p>
@@ -1896,7 +1895,7 @@
             <a:fld id="{1D8BD707-D9CF-40AE-B4C6-C98DA3205C09}" type="datetimeFigureOut">
               <a:rPr lang="en-US" smtClean="0"/>
               <a:pPr/>
-              <a:t>1/8/2025</a:t>
+              <a:t>1/9/2025</a:t>
             </a:fld>
             <a:endParaRPr lang="en-US"/>
           </a:p>
@@ -1988,7 +1987,7 @@
             <a:fld id="{1D8BD707-D9CF-40AE-B4C6-C98DA3205C09}" type="datetimeFigureOut">
               <a:rPr lang="en-US" smtClean="0"/>
               <a:pPr/>
-              <a:t>1/8/2025</a:t>
+              <a:t>1/9/2025</a:t>
             </a:fld>
             <a:endParaRPr lang="en-US"/>
           </a:p>
@@ -2260,7 +2259,7 @@
             <a:fld id="{1D8BD707-D9CF-40AE-B4C6-C98DA3205C09}" type="datetimeFigureOut">
               <a:rPr lang="en-US" smtClean="0"/>
               <a:pPr/>
-              <a:t>1/8/2025</a:t>
+              <a:t>1/9/2025</a:t>
             </a:fld>
             <a:endParaRPr lang="en-US"/>
           </a:p>
@@ -2509,7 +2508,7 @@
             <a:fld id="{1D8BD707-D9CF-40AE-B4C6-C98DA3205C09}" type="datetimeFigureOut">
               <a:rPr lang="en-US" smtClean="0"/>
               <a:pPr/>
-              <a:t>1/8/2025</a:t>
+              <a:t>1/9/2025</a:t>
             </a:fld>
             <a:endParaRPr lang="en-US"/>
           </a:p>
@@ -2717,7 +2716,7 @@
             <a:fld id="{1D8BD707-D9CF-40AE-B4C6-C98DA3205C09}" type="datetimeFigureOut">
               <a:rPr lang="en-US" smtClean="0"/>
               <a:pPr/>
-              <a:t>1/8/2025</a:t>
+              <a:t>1/9/2025</a:t>
             </a:fld>
             <a:endParaRPr lang="en-US"/>
           </a:p>
@@ -4375,419 +4374,6 @@
       <p:bldP spid="5" grpId="0"/>
       <p:bldP spid="6" grpId="0"/>
       <p:bldP spid="33" grpId="0"/>
-    </p:bldLst>
-  </p:timing>
-</p:sld>
-</file>
-
-<file path=ppt/slides/slide10.xml><?xml version="1.0" encoding="utf-8"?>
-<p:sld xmlns:a="http://schemas.openxmlformats.org/drawingml/2006/main" xmlns:r="http://schemas.openxmlformats.org/officeDocument/2006/relationships" xmlns:p="http://schemas.openxmlformats.org/presentationml/2006/main">
-  <p:cSld>
-    <p:spTree>
-      <p:nvGrpSpPr>
-        <p:cNvPr id="1" name=""/>
-        <p:cNvGrpSpPr/>
-        <p:nvPr/>
-      </p:nvGrpSpPr>
-      <p:grpSpPr>
-        <a:xfrm>
-          <a:off x="0" y="0"/>
-          <a:ext cx="0" cy="0"/>
-          <a:chOff x="0" y="0"/>
-          <a:chExt cx="0" cy="0"/>
-        </a:xfrm>
-      </p:grpSpPr>
-      <p:grpSp>
-        <p:nvGrpSpPr>
-          <p:cNvPr id="2" name="Group 2"/>
-          <p:cNvGrpSpPr/>
-          <p:nvPr/>
-        </p:nvGrpSpPr>
-        <p:grpSpPr>
-          <a:xfrm>
-            <a:off x="1588329" y="2113980"/>
-            <a:ext cx="2878700" cy="6059040"/>
-            <a:chOff x="0" y="0"/>
-            <a:chExt cx="758176" cy="1595797"/>
-          </a:xfrm>
-        </p:grpSpPr>
-        <p:sp>
-          <p:nvSpPr>
-            <p:cNvPr id="3" name="Freeform 3"/>
-            <p:cNvSpPr/>
-            <p:nvPr/>
-          </p:nvSpPr>
-          <p:spPr>
-            <a:xfrm>
-              <a:off x="0" y="0"/>
-              <a:ext cx="758176" cy="1595797"/>
-            </a:xfrm>
-            <a:custGeom>
-              <a:avLst/>
-              <a:gdLst/>
-              <a:ahLst/>
-              <a:cxnLst/>
-              <a:rect l="l" t="t" r="r" b="b"/>
-              <a:pathLst>
-                <a:path w="758176" h="1595797">
-                  <a:moveTo>
-                    <a:pt x="0" y="0"/>
-                  </a:moveTo>
-                  <a:lnTo>
-                    <a:pt x="758176" y="0"/>
-                  </a:lnTo>
-                  <a:lnTo>
-                    <a:pt x="758176" y="1595797"/>
-                  </a:lnTo>
-                  <a:lnTo>
-                    <a:pt x="0" y="1595797"/>
-                  </a:lnTo>
-                  <a:close/>
-                </a:path>
-              </a:pathLst>
-            </a:custGeom>
-            <a:solidFill>
-              <a:srgbClr val="FFC2CA"/>
-            </a:solidFill>
-          </p:spPr>
-        </p:sp>
-        <p:sp>
-          <p:nvSpPr>
-            <p:cNvPr id="4" name="TextBox 4"/>
-            <p:cNvSpPr txBox="1"/>
-            <p:nvPr/>
-          </p:nvSpPr>
-          <p:spPr>
-            <a:xfrm>
-              <a:off x="0" y="-38100"/>
-              <a:ext cx="758176" cy="1633897"/>
-            </a:xfrm>
-            <a:prstGeom prst="rect">
-              <a:avLst/>
-            </a:prstGeom>
-          </p:spPr>
-          <p:txBody>
-            <a:bodyPr lIns="50800" tIns="50800" rIns="50800" bIns="50800" rtlCol="0" anchor="ctr"/>
-            <a:lstStyle/>
-            <a:p>
-              <a:pPr algn="ctr">
-                <a:lnSpc>
-                  <a:spcPts val="2659"/>
-                </a:lnSpc>
-              </a:pPr>
-              <a:endParaRPr/>
-            </a:p>
-          </p:txBody>
-        </p:sp>
-      </p:grpSp>
-      <p:sp>
-        <p:nvSpPr>
-          <p:cNvPr id="5" name="TextBox 5"/>
-          <p:cNvSpPr txBox="1"/>
-          <p:nvPr/>
-        </p:nvSpPr>
-        <p:spPr>
-          <a:xfrm>
-            <a:off x="3724086" y="3883258"/>
-            <a:ext cx="7653319" cy="1708154"/>
-          </a:xfrm>
-          <a:prstGeom prst="rect">
-            <a:avLst/>
-          </a:prstGeom>
-        </p:spPr>
-        <p:txBody>
-          <a:bodyPr lIns="0" tIns="0" rIns="0" bIns="0" rtlCol="0" anchor="t">
-            <a:spAutoFit/>
-          </a:bodyPr>
-          <a:lstStyle/>
-          <a:p>
-            <a:pPr algn="l">
-              <a:lnSpc>
-                <a:spcPts val="13999"/>
-              </a:lnSpc>
-            </a:pPr>
-            <a:r>
-              <a:rPr lang="en-US" sz="9999" b="1" u="sng" dirty="0">
-                <a:solidFill>
-                  <a:srgbClr val="2E2E2E"/>
-                </a:solidFill>
-                <a:latin typeface="Lato Bold"/>
-                <a:ea typeface="Lato Bold"/>
-                <a:cs typeface="Lato Bold"/>
-                <a:sym typeface="Lato Bold"/>
-              </a:rPr>
-              <a:t>Thank You</a:t>
-            </a:r>
-          </a:p>
-        </p:txBody>
-      </p:sp>
-      <p:grpSp>
-        <p:nvGrpSpPr>
-          <p:cNvPr id="6" name="Group 6"/>
-          <p:cNvGrpSpPr/>
-          <p:nvPr/>
-        </p:nvGrpSpPr>
-        <p:grpSpPr>
-          <a:xfrm>
-            <a:off x="17259300" y="3803885"/>
-            <a:ext cx="1028700" cy="5454415"/>
-            <a:chOff x="0" y="0"/>
-            <a:chExt cx="270933" cy="1436554"/>
-          </a:xfrm>
-        </p:grpSpPr>
-        <p:sp>
-          <p:nvSpPr>
-            <p:cNvPr id="7" name="Freeform 7"/>
-            <p:cNvSpPr/>
-            <p:nvPr/>
-          </p:nvSpPr>
-          <p:spPr>
-            <a:xfrm>
-              <a:off x="0" y="0"/>
-              <a:ext cx="270933" cy="1436554"/>
-            </a:xfrm>
-            <a:custGeom>
-              <a:avLst/>
-              <a:gdLst/>
-              <a:ahLst/>
-              <a:cxnLst/>
-              <a:rect l="l" t="t" r="r" b="b"/>
-              <a:pathLst>
-                <a:path w="270933" h="1436554">
-                  <a:moveTo>
-                    <a:pt x="0" y="0"/>
-                  </a:moveTo>
-                  <a:lnTo>
-                    <a:pt x="270933" y="0"/>
-                  </a:lnTo>
-                  <a:lnTo>
-                    <a:pt x="270933" y="1436554"/>
-                  </a:lnTo>
-                  <a:lnTo>
-                    <a:pt x="0" y="1436554"/>
-                  </a:lnTo>
-                  <a:close/>
-                </a:path>
-              </a:pathLst>
-            </a:custGeom>
-            <a:solidFill>
-              <a:srgbClr val="FFC2CA"/>
-            </a:solidFill>
-          </p:spPr>
-        </p:sp>
-        <p:sp>
-          <p:nvSpPr>
-            <p:cNvPr id="8" name="TextBox 8"/>
-            <p:cNvSpPr txBox="1"/>
-            <p:nvPr/>
-          </p:nvSpPr>
-          <p:spPr>
-            <a:xfrm>
-              <a:off x="0" y="-38100"/>
-              <a:ext cx="270933" cy="1474654"/>
-            </a:xfrm>
-            <a:prstGeom prst="rect">
-              <a:avLst/>
-            </a:prstGeom>
-          </p:spPr>
-          <p:txBody>
-            <a:bodyPr lIns="50800" tIns="50800" rIns="50800" bIns="50800" rtlCol="0" anchor="ctr"/>
-            <a:lstStyle/>
-            <a:p>
-              <a:pPr algn="ctr">
-                <a:lnSpc>
-                  <a:spcPts val="2659"/>
-                </a:lnSpc>
-              </a:pPr>
-              <a:endParaRPr/>
-            </a:p>
-          </p:txBody>
-        </p:sp>
-      </p:grpSp>
-      <p:sp>
-        <p:nvSpPr>
-          <p:cNvPr id="10" name="TextBox 10"/>
-          <p:cNvSpPr txBox="1"/>
-          <p:nvPr/>
-        </p:nvSpPr>
-        <p:spPr>
-          <a:xfrm>
-            <a:off x="5320274" y="3756260"/>
-            <a:ext cx="3536394" cy="336311"/>
-          </a:xfrm>
-          <a:prstGeom prst="rect">
-            <a:avLst/>
-          </a:prstGeom>
-        </p:spPr>
-        <p:txBody>
-          <a:bodyPr lIns="0" tIns="0" rIns="0" bIns="0" rtlCol="0" anchor="t">
-            <a:spAutoFit/>
-          </a:bodyPr>
-          <a:lstStyle/>
-          <a:p>
-            <a:pPr algn="l">
-              <a:lnSpc>
-                <a:spcPts val="2940"/>
-              </a:lnSpc>
-            </a:pPr>
-            <a:r>
-              <a:rPr lang="en-US" sz="2100" b="1" dirty="0">
-                <a:solidFill>
-                  <a:srgbClr val="796292"/>
-                </a:solidFill>
-                <a:latin typeface="Lato Bold"/>
-                <a:ea typeface="Lato Bold"/>
-                <a:cs typeface="Lato Bold"/>
-                <a:sym typeface="Lato Bold"/>
-              </a:rPr>
-              <a:t>Lecture Completed!</a:t>
-            </a:r>
-          </a:p>
-        </p:txBody>
-      </p:sp>
-    </p:spTree>
-  </p:cSld>
-  <p:clrMapOvr>
-    <a:masterClrMapping/>
-  </p:clrMapOvr>
-  <p:timing>
-    <p:tnLst>
-      <p:par>
-        <p:cTn id="1" dur="indefinite" restart="never" nodeType="tmRoot">
-          <p:childTnLst>
-            <p:seq concurrent="1" nextAc="seek">
-              <p:cTn id="2" dur="indefinite" nodeType="mainSeq">
-                <p:childTnLst>
-                  <p:par>
-                    <p:cTn id="3" fill="hold">
-                      <p:stCondLst>
-                        <p:cond delay="indefinite"/>
-                      </p:stCondLst>
-                      <p:childTnLst>
-                        <p:par>
-                          <p:cTn id="4" fill="hold">
-                            <p:stCondLst>
-                              <p:cond delay="0"/>
-                            </p:stCondLst>
-                            <p:childTnLst>
-                              <p:par>
-                                <p:cTn id="5" presetID="22" presetClass="entr" presetSubtype="4" fill="hold" grpId="0" nodeType="clickEffect">
-                                  <p:stCondLst>
-                                    <p:cond delay="0"/>
-                                  </p:stCondLst>
-                                  <p:childTnLst>
-                                    <p:set>
-                                      <p:cBhvr>
-                                        <p:cTn id="6" dur="1" fill="hold">
-                                          <p:stCondLst>
-                                            <p:cond delay="0"/>
-                                          </p:stCondLst>
-                                        </p:cTn>
-                                        <p:tgtEl>
-                                          <p:spTgt spid="10"/>
-                                        </p:tgtEl>
-                                        <p:attrNameLst>
-                                          <p:attrName>style.visibility</p:attrName>
-                                        </p:attrNameLst>
-                                      </p:cBhvr>
-                                      <p:to>
-                                        <p:strVal val="visible"/>
-                                      </p:to>
-                                    </p:set>
-                                    <p:animEffect transition="in" filter="wipe(down)">
-                                      <p:cBhvr>
-                                        <p:cTn id="7" dur="500"/>
-                                        <p:tgtEl>
-                                          <p:spTgt spid="10"/>
-                                        </p:tgtEl>
-                                      </p:cBhvr>
-                                    </p:animEffect>
-                                  </p:childTnLst>
-                                </p:cTn>
-                              </p:par>
-                            </p:childTnLst>
-                          </p:cTn>
-                        </p:par>
-                      </p:childTnLst>
-                    </p:cTn>
-                  </p:par>
-                  <p:par>
-                    <p:cTn id="8" fill="hold">
-                      <p:stCondLst>
-                        <p:cond delay="indefinite"/>
-                      </p:stCondLst>
-                      <p:childTnLst>
-                        <p:par>
-                          <p:cTn id="9" fill="hold">
-                            <p:stCondLst>
-                              <p:cond delay="0"/>
-                            </p:stCondLst>
-                            <p:childTnLst>
-                              <p:par>
-                                <p:cTn id="10" presetID="22" presetClass="entr" presetSubtype="4" fill="hold" grpId="0" nodeType="clickEffect">
-                                  <p:stCondLst>
-                                    <p:cond delay="0"/>
-                                  </p:stCondLst>
-                                  <p:childTnLst>
-                                    <p:set>
-                                      <p:cBhvr>
-                                        <p:cTn id="11" dur="1" fill="hold">
-                                          <p:stCondLst>
-                                            <p:cond delay="0"/>
-                                          </p:stCondLst>
-                                        </p:cTn>
-                                        <p:tgtEl>
-                                          <p:spTgt spid="5"/>
-                                        </p:tgtEl>
-                                        <p:attrNameLst>
-                                          <p:attrName>style.visibility</p:attrName>
-                                        </p:attrNameLst>
-                                      </p:cBhvr>
-                                      <p:to>
-                                        <p:strVal val="visible"/>
-                                      </p:to>
-                                    </p:set>
-                                    <p:animEffect transition="in" filter="wipe(down)">
-                                      <p:cBhvr>
-                                        <p:cTn id="12" dur="500"/>
-                                        <p:tgtEl>
-                                          <p:spTgt spid="5"/>
-                                        </p:tgtEl>
-                                      </p:cBhvr>
-                                    </p:animEffect>
-                                  </p:childTnLst>
-                                </p:cTn>
-                              </p:par>
-                            </p:childTnLst>
-                          </p:cTn>
-                        </p:par>
-                      </p:childTnLst>
-                    </p:cTn>
-                  </p:par>
-                </p:childTnLst>
-              </p:cTn>
-              <p:prevCondLst>
-                <p:cond evt="onPrev" delay="0">
-                  <p:tgtEl>
-                    <p:sldTgt/>
-                  </p:tgtEl>
-                </p:cond>
-              </p:prevCondLst>
-              <p:nextCondLst>
-                <p:cond evt="onNext" delay="0">
-                  <p:tgtEl>
-                    <p:sldTgt/>
-                  </p:tgtEl>
-                </p:cond>
-              </p:nextCondLst>
-            </p:seq>
-          </p:childTnLst>
-        </p:cTn>
-      </p:par>
-    </p:tnLst>
-    <p:bldLst>
-      <p:bldP spid="5" grpId="0"/>
-      <p:bldP spid="10" grpId="0"/>
     </p:bldLst>
   </p:timing>
 </p:sld>
@@ -7838,7 +7424,7 @@
         </p:blipFill>
         <p:spPr>
           <a:xfrm>
-            <a:off x="3030930" y="2039819"/>
+            <a:off x="3089157" y="2752681"/>
             <a:ext cx="12123285" cy="7534319"/>
           </a:xfrm>
           <a:prstGeom prst="rect">
@@ -7867,7 +7453,7 @@
         <p:cNvPr id="1" name="">
           <a:extLst>
             <a:ext uri="{FF2B5EF4-FFF2-40B4-BE49-F238E27FC236}">
-              <a16:creationId xmlns:a16="http://schemas.microsoft.com/office/drawing/2014/main" id="{AE6BD955-0B7F-55C7-65B2-A3C40A855ACC}"/>
+              <a16:creationId xmlns:a16="http://schemas.microsoft.com/office/drawing/2014/main" id="{E19BE3D7-0DAF-3C6F-B76C-2EC4CC09C237}"/>
             </a:ext>
           </a:extLst>
         </p:cNvPr>
@@ -7887,7 +7473,7 @@
           <p:cNvPr id="2" name="Group 2">
             <a:extLst>
               <a:ext uri="{FF2B5EF4-FFF2-40B4-BE49-F238E27FC236}">
-                <a16:creationId xmlns:a16="http://schemas.microsoft.com/office/drawing/2014/main" id="{3C912C25-FAC7-3A99-B35B-8F109E7EFD2B}"/>
+                <a16:creationId xmlns:a16="http://schemas.microsoft.com/office/drawing/2014/main" id="{2E4E2B4D-E71F-DBCA-F60E-62EFE12ED452}"/>
               </a:ext>
             </a:extLst>
           </p:cNvPr>
@@ -7907,7 +7493,7 @@
             <p:cNvPr id="3" name="Freeform 3">
               <a:extLst>
                 <a:ext uri="{FF2B5EF4-FFF2-40B4-BE49-F238E27FC236}">
-                  <a16:creationId xmlns:a16="http://schemas.microsoft.com/office/drawing/2014/main" id="{5D0FB69B-9DB8-D324-454E-BE63BA880E10}"/>
+                  <a16:creationId xmlns:a16="http://schemas.microsoft.com/office/drawing/2014/main" id="{A69A3BF7-6922-B9B3-7522-3B353322D8F5}"/>
                 </a:ext>
               </a:extLst>
             </p:cNvPr>
@@ -7953,7 +7539,7 @@
             <p:cNvPr id="4" name="TextBox 4">
               <a:extLst>
                 <a:ext uri="{FF2B5EF4-FFF2-40B4-BE49-F238E27FC236}">
-                  <a16:creationId xmlns:a16="http://schemas.microsoft.com/office/drawing/2014/main" id="{8CC7A140-C72D-7284-07BE-0BD1A927DA6C}"/>
+                  <a16:creationId xmlns:a16="http://schemas.microsoft.com/office/drawing/2014/main" id="{72C597F2-0E57-F903-0391-6B76D70917CB}"/>
                 </a:ext>
               </a:extLst>
             </p:cNvPr>
@@ -7988,7 +7574,7 @@
           <p:cNvPr id="5" name="Group 5">
             <a:extLst>
               <a:ext uri="{FF2B5EF4-FFF2-40B4-BE49-F238E27FC236}">
-                <a16:creationId xmlns:a16="http://schemas.microsoft.com/office/drawing/2014/main" id="{04206ECC-2FBA-1029-C2BE-B6CC8DBE23BD}"/>
+                <a16:creationId xmlns:a16="http://schemas.microsoft.com/office/drawing/2014/main" id="{231604B6-6BD9-7C15-2E58-789752FC5A47}"/>
               </a:ext>
             </a:extLst>
           </p:cNvPr>
@@ -8008,7 +7594,7 @@
             <p:cNvPr id="6" name="Freeform 6">
               <a:extLst>
                 <a:ext uri="{FF2B5EF4-FFF2-40B4-BE49-F238E27FC236}">
-                  <a16:creationId xmlns:a16="http://schemas.microsoft.com/office/drawing/2014/main" id="{EC749093-2CEE-0328-32ED-CA38CBC6320E}"/>
+                  <a16:creationId xmlns:a16="http://schemas.microsoft.com/office/drawing/2014/main" id="{C4EC3105-BFB1-BF2B-EA51-E6240A3477B6}"/>
                 </a:ext>
               </a:extLst>
             </p:cNvPr>
@@ -8054,7 +7640,7 @@
             <p:cNvPr id="7" name="TextBox 7">
               <a:extLst>
                 <a:ext uri="{FF2B5EF4-FFF2-40B4-BE49-F238E27FC236}">
-                  <a16:creationId xmlns:a16="http://schemas.microsoft.com/office/drawing/2014/main" id="{1F64E988-E1A8-2B00-A5E6-5A898C97C424}"/>
+                  <a16:creationId xmlns:a16="http://schemas.microsoft.com/office/drawing/2014/main" id="{3331286D-D95F-40C3-CADD-6D2EB4BAD6AE}"/>
                 </a:ext>
               </a:extLst>
             </p:cNvPr>
@@ -8089,7 +7675,7 @@
           <p:cNvPr id="8" name="TextBox 9">
             <a:extLst>
               <a:ext uri="{FF2B5EF4-FFF2-40B4-BE49-F238E27FC236}">
-                <a16:creationId xmlns:a16="http://schemas.microsoft.com/office/drawing/2014/main" id="{3B11B67F-6A46-6FEA-95CC-F292F466EC38}"/>
+                <a16:creationId xmlns:a16="http://schemas.microsoft.com/office/drawing/2014/main" id="{6073773B-1632-97E9-B780-3F350405F832}"/>
               </a:ext>
             </a:extLst>
           </p:cNvPr>
@@ -8136,7 +7722,7 @@
           <p:cNvPr id="11" name="TextBox 10">
             <a:extLst>
               <a:ext uri="{FF2B5EF4-FFF2-40B4-BE49-F238E27FC236}">
-                <a16:creationId xmlns:a16="http://schemas.microsoft.com/office/drawing/2014/main" id="{72B49463-3479-F1F8-6FC9-AB54556FACF2}"/>
+                <a16:creationId xmlns:a16="http://schemas.microsoft.com/office/drawing/2014/main" id="{0BF0C594-F943-7E19-DA9E-5A8C1DFBC067}"/>
               </a:ext>
             </a:extLst>
           </p:cNvPr>
@@ -8146,7 +7732,7 @@
         <p:spPr>
           <a:xfrm>
             <a:off x="3055468" y="3238500"/>
-            <a:ext cx="13327532" cy="6263253"/>
+            <a:ext cx="13327532" cy="6832640"/>
           </a:xfrm>
           <a:prstGeom prst="rect">
             <a:avLst/>
@@ -8181,7 +7767,7 @@
                 <a:cs typeface="Lato" panose="020F0502020204030203" pitchFamily="34" charset="0"/>
                 <a:sym typeface="Lato"/>
               </a:rPr>
-              <a:t>Executes as long as the condition is true. Condition is checked before executing the loop body.</a:t>
+              <a:t>Executes as long as the condition is true. Condition is checked before executing the loop body. Number of iterations in unknown.</a:t>
             </a:r>
           </a:p>
           <a:p>
@@ -8244,7 +7830,7 @@
               <a:rPr lang="en-US" sz="3700" dirty="0">
                 <a:latin typeface="Constantia" panose="02030602050306030303" pitchFamily="18" charset="0"/>
               </a:rPr>
-              <a:t>Designed for fixed number of iteration, with initialization, condition &amp; increment/decrement in single statement.</a:t>
+              <a:t>In for loop number of iterations is known with initialization, condition &amp; increment/decrement in single statement.</a:t>
             </a:r>
           </a:p>
         </p:txBody>
@@ -8252,7 +7838,7 @@
     </p:spTree>
     <p:extLst>
       <p:ext uri="{BB962C8B-B14F-4D97-AF65-F5344CB8AC3E}">
-        <p14:creationId xmlns:p14="http://schemas.microsoft.com/office/powerpoint/2010/main" val="2570215783"/>
+        <p14:creationId xmlns:p14="http://schemas.microsoft.com/office/powerpoint/2010/main" val="3853349485"/>
       </p:ext>
     </p:extLst>
   </p:cSld>
@@ -8594,733 +8180,6 @@
         <p:cNvPr id="1" name="">
           <a:extLst>
             <a:ext uri="{FF2B5EF4-FFF2-40B4-BE49-F238E27FC236}">
-              <a16:creationId xmlns:a16="http://schemas.microsoft.com/office/drawing/2014/main" id="{E19BE3D7-0DAF-3C6F-B76C-2EC4CC09C237}"/>
-            </a:ext>
-          </a:extLst>
-        </p:cNvPr>
-        <p:cNvGrpSpPr/>
-        <p:nvPr/>
-      </p:nvGrpSpPr>
-      <p:grpSpPr>
-        <a:xfrm>
-          <a:off x="0" y="0"/>
-          <a:ext cx="0" cy="0"/>
-          <a:chOff x="0" y="0"/>
-          <a:chExt cx="0" cy="0"/>
-        </a:xfrm>
-      </p:grpSpPr>
-      <p:grpSp>
-        <p:nvGrpSpPr>
-          <p:cNvPr id="2" name="Group 2">
-            <a:extLst>
-              <a:ext uri="{FF2B5EF4-FFF2-40B4-BE49-F238E27FC236}">
-                <a16:creationId xmlns:a16="http://schemas.microsoft.com/office/drawing/2014/main" id="{2E4E2B4D-E71F-DBCA-F60E-62EFE12ED452}"/>
-              </a:ext>
-            </a:extLst>
-          </p:cNvPr>
-          <p:cNvGrpSpPr/>
-          <p:nvPr/>
-        </p:nvGrpSpPr>
-        <p:grpSpPr>
-          <a:xfrm>
-            <a:off x="0" y="0"/>
-            <a:ext cx="2337212" cy="3086100"/>
-            <a:chOff x="0" y="0"/>
-            <a:chExt cx="615562" cy="812800"/>
-          </a:xfrm>
-        </p:grpSpPr>
-        <p:sp>
-          <p:nvSpPr>
-            <p:cNvPr id="3" name="Freeform 3">
-              <a:extLst>
-                <a:ext uri="{FF2B5EF4-FFF2-40B4-BE49-F238E27FC236}">
-                  <a16:creationId xmlns:a16="http://schemas.microsoft.com/office/drawing/2014/main" id="{A69A3BF7-6922-B9B3-7522-3B353322D8F5}"/>
-                </a:ext>
-              </a:extLst>
-            </p:cNvPr>
-            <p:cNvSpPr/>
-            <p:nvPr/>
-          </p:nvSpPr>
-          <p:spPr>
-            <a:xfrm>
-              <a:off x="0" y="0"/>
-              <a:ext cx="615562" cy="812800"/>
-            </a:xfrm>
-            <a:custGeom>
-              <a:avLst/>
-              <a:gdLst/>
-              <a:ahLst/>
-              <a:cxnLst/>
-              <a:rect l="l" t="t" r="r" b="b"/>
-              <a:pathLst>
-                <a:path w="615562" h="812800">
-                  <a:moveTo>
-                    <a:pt x="0" y="0"/>
-                  </a:moveTo>
-                  <a:lnTo>
-                    <a:pt x="615562" y="0"/>
-                  </a:lnTo>
-                  <a:lnTo>
-                    <a:pt x="615562" y="812800"/>
-                  </a:lnTo>
-                  <a:lnTo>
-                    <a:pt x="0" y="812800"/>
-                  </a:lnTo>
-                  <a:close/>
-                </a:path>
-              </a:pathLst>
-            </a:custGeom>
-            <a:solidFill>
-              <a:srgbClr val="F9ECB8"/>
-            </a:solidFill>
-          </p:spPr>
-        </p:sp>
-        <p:sp>
-          <p:nvSpPr>
-            <p:cNvPr id="4" name="TextBox 4">
-              <a:extLst>
-                <a:ext uri="{FF2B5EF4-FFF2-40B4-BE49-F238E27FC236}">
-                  <a16:creationId xmlns:a16="http://schemas.microsoft.com/office/drawing/2014/main" id="{72C597F2-0E57-F903-0391-6B76D70917CB}"/>
-                </a:ext>
-              </a:extLst>
-            </p:cNvPr>
-            <p:cNvSpPr txBox="1"/>
-            <p:nvPr/>
-          </p:nvSpPr>
-          <p:spPr>
-            <a:xfrm>
-              <a:off x="0" y="-38100"/>
-              <a:ext cx="615562" cy="850900"/>
-            </a:xfrm>
-            <a:prstGeom prst="rect">
-              <a:avLst/>
-            </a:prstGeom>
-          </p:spPr>
-          <p:txBody>
-            <a:bodyPr lIns="50800" tIns="50800" rIns="50800" bIns="50800" rtlCol="0" anchor="ctr"/>
-            <a:lstStyle/>
-            <a:p>
-              <a:pPr algn="ctr">
-                <a:lnSpc>
-                  <a:spcPts val="2659"/>
-                </a:lnSpc>
-              </a:pPr>
-              <a:endParaRPr/>
-            </a:p>
-          </p:txBody>
-        </p:sp>
-      </p:grpSp>
-      <p:grpSp>
-        <p:nvGrpSpPr>
-          <p:cNvPr id="5" name="Group 5">
-            <a:extLst>
-              <a:ext uri="{FF2B5EF4-FFF2-40B4-BE49-F238E27FC236}">
-                <a16:creationId xmlns:a16="http://schemas.microsoft.com/office/drawing/2014/main" id="{231604B6-6BD9-7C15-2E58-789752FC5A47}"/>
-              </a:ext>
-            </a:extLst>
-          </p:cNvPr>
-          <p:cNvGrpSpPr/>
-          <p:nvPr/>
-        </p:nvGrpSpPr>
-        <p:grpSpPr>
-          <a:xfrm>
-            <a:off x="17115856" y="4227960"/>
-            <a:ext cx="1172144" cy="6059040"/>
-            <a:chOff x="0" y="0"/>
-            <a:chExt cx="308713" cy="1595797"/>
-          </a:xfrm>
-        </p:grpSpPr>
-        <p:sp>
-          <p:nvSpPr>
-            <p:cNvPr id="6" name="Freeform 6">
-              <a:extLst>
-                <a:ext uri="{FF2B5EF4-FFF2-40B4-BE49-F238E27FC236}">
-                  <a16:creationId xmlns:a16="http://schemas.microsoft.com/office/drawing/2014/main" id="{C4EC3105-BFB1-BF2B-EA51-E6240A3477B6}"/>
-                </a:ext>
-              </a:extLst>
-            </p:cNvPr>
-            <p:cNvSpPr/>
-            <p:nvPr/>
-          </p:nvSpPr>
-          <p:spPr>
-            <a:xfrm>
-              <a:off x="0" y="0"/>
-              <a:ext cx="308713" cy="1595797"/>
-            </a:xfrm>
-            <a:custGeom>
-              <a:avLst/>
-              <a:gdLst/>
-              <a:ahLst/>
-              <a:cxnLst/>
-              <a:rect l="l" t="t" r="r" b="b"/>
-              <a:pathLst>
-                <a:path w="308713" h="1595797">
-                  <a:moveTo>
-                    <a:pt x="0" y="0"/>
-                  </a:moveTo>
-                  <a:lnTo>
-                    <a:pt x="308713" y="0"/>
-                  </a:lnTo>
-                  <a:lnTo>
-                    <a:pt x="308713" y="1595797"/>
-                  </a:lnTo>
-                  <a:lnTo>
-                    <a:pt x="0" y="1595797"/>
-                  </a:lnTo>
-                  <a:close/>
-                </a:path>
-              </a:pathLst>
-            </a:custGeom>
-            <a:solidFill>
-              <a:srgbClr val="FFC2CA"/>
-            </a:solidFill>
-          </p:spPr>
-        </p:sp>
-        <p:sp>
-          <p:nvSpPr>
-            <p:cNvPr id="7" name="TextBox 7">
-              <a:extLst>
-                <a:ext uri="{FF2B5EF4-FFF2-40B4-BE49-F238E27FC236}">
-                  <a16:creationId xmlns:a16="http://schemas.microsoft.com/office/drawing/2014/main" id="{3331286D-D95F-40C3-CADD-6D2EB4BAD6AE}"/>
-                </a:ext>
-              </a:extLst>
-            </p:cNvPr>
-            <p:cNvSpPr txBox="1"/>
-            <p:nvPr/>
-          </p:nvSpPr>
-          <p:spPr>
-            <a:xfrm>
-              <a:off x="0" y="-38100"/>
-              <a:ext cx="308713" cy="1633897"/>
-            </a:xfrm>
-            <a:prstGeom prst="rect">
-              <a:avLst/>
-            </a:prstGeom>
-          </p:spPr>
-          <p:txBody>
-            <a:bodyPr lIns="50800" tIns="50800" rIns="50800" bIns="50800" rtlCol="0" anchor="ctr"/>
-            <a:lstStyle/>
-            <a:p>
-              <a:pPr algn="ctr">
-                <a:lnSpc>
-                  <a:spcPts val="2659"/>
-                </a:lnSpc>
-              </a:pPr>
-              <a:endParaRPr/>
-            </a:p>
-          </p:txBody>
-        </p:sp>
-      </p:grpSp>
-      <p:sp>
-        <p:nvSpPr>
-          <p:cNvPr id="8" name="TextBox 9">
-            <a:extLst>
-              <a:ext uri="{FF2B5EF4-FFF2-40B4-BE49-F238E27FC236}">
-                <a16:creationId xmlns:a16="http://schemas.microsoft.com/office/drawing/2014/main" id="{6073773B-1632-97E9-B780-3F350405F832}"/>
-              </a:ext>
-            </a:extLst>
-          </p:cNvPr>
-          <p:cNvSpPr txBox="1"/>
-          <p:nvPr/>
-        </p:nvSpPr>
-        <p:spPr>
-          <a:xfrm>
-            <a:off x="3055469" y="1104900"/>
-            <a:ext cx="12413131" cy="1795363"/>
-          </a:xfrm>
-          <a:prstGeom prst="rect">
-            <a:avLst/>
-          </a:prstGeom>
-        </p:spPr>
-        <p:txBody>
-          <a:bodyPr wrap="square" lIns="0" tIns="0" rIns="0" bIns="0" rtlCol="0" anchor="t">
-            <a:spAutoFit/>
-          </a:bodyPr>
-          <a:lstStyle/>
-          <a:p>
-            <a:pPr algn="l">
-              <a:lnSpc>
-                <a:spcPts val="7000"/>
-              </a:lnSpc>
-            </a:pPr>
-            <a:r>
-              <a:rPr lang="en-US" sz="6000" b="1" spc="-100" dirty="0">
-                <a:solidFill>
-                  <a:srgbClr val="2E2E2E"/>
-                </a:solidFill>
-                <a:latin typeface="Lato Bold"/>
-                <a:ea typeface="Lato Bold"/>
-                <a:cs typeface="Lato Bold"/>
-                <a:sym typeface="Lato Bold"/>
-              </a:rPr>
-              <a:t>Difference Between While, For, Do While</a:t>
-            </a:r>
-          </a:p>
-        </p:txBody>
-      </p:sp>
-      <p:sp>
-        <p:nvSpPr>
-          <p:cNvPr id="11" name="TextBox 10">
-            <a:extLst>
-              <a:ext uri="{FF2B5EF4-FFF2-40B4-BE49-F238E27FC236}">
-                <a16:creationId xmlns:a16="http://schemas.microsoft.com/office/drawing/2014/main" id="{0BF0C594-F943-7E19-DA9E-5A8C1DFBC067}"/>
-              </a:ext>
-            </a:extLst>
-          </p:cNvPr>
-          <p:cNvSpPr txBox="1"/>
-          <p:nvPr/>
-        </p:nvSpPr>
-        <p:spPr>
-          <a:xfrm>
-            <a:off x="3055468" y="3238500"/>
-            <a:ext cx="13327532" cy="6263253"/>
-          </a:xfrm>
-          <a:prstGeom prst="rect">
-            <a:avLst/>
-          </a:prstGeom>
-        </p:spPr>
-        <p:txBody>
-          <a:bodyPr wrap="square" lIns="0" tIns="0" rIns="0" bIns="0" rtlCol="0" anchor="t">
-            <a:spAutoFit/>
-          </a:bodyPr>
-          <a:lstStyle/>
-          <a:p>
-            <a:pPr marL="571500" indent="-571500" algn="just">
-              <a:buFont typeface="Wingdings" panose="05000000000000000000" pitchFamily="2" charset="2"/>
-              <a:buChar char="q"/>
-            </a:pPr>
-            <a:r>
-              <a:rPr lang="en-US" sz="3700" b="1" dirty="0">
-                <a:latin typeface="Constantia" panose="02030602050306030303" pitchFamily="18" charset="0"/>
-                <a:ea typeface="Lato" panose="020F0502020204030203" pitchFamily="34" charset="0"/>
-                <a:cs typeface="Lato" panose="020F0502020204030203" pitchFamily="34" charset="0"/>
-                <a:sym typeface="Lato"/>
-              </a:rPr>
-              <a:t>While:</a:t>
-            </a:r>
-          </a:p>
-          <a:p>
-            <a:pPr lvl="1" algn="just"/>
-            <a:r>
-              <a:rPr lang="en-US" sz="3700" dirty="0">
-                <a:latin typeface="Constantia" panose="02030602050306030303" pitchFamily="18" charset="0"/>
-                <a:ea typeface="Lato" panose="020F0502020204030203" pitchFamily="34" charset="0"/>
-                <a:cs typeface="Lato" panose="020F0502020204030203" pitchFamily="34" charset="0"/>
-                <a:sym typeface="Lato"/>
-              </a:rPr>
-              <a:t>Executes as long as the condition is true. Condition is checked before executing the loop body.</a:t>
-            </a:r>
-          </a:p>
-          <a:p>
-            <a:pPr lvl="1" algn="just"/>
-            <a:endParaRPr lang="en-US" sz="3700" dirty="0">
-              <a:latin typeface="Constantia" panose="02030602050306030303" pitchFamily="18" charset="0"/>
-              <a:ea typeface="Lato" panose="020F0502020204030203" pitchFamily="34" charset="0"/>
-              <a:cs typeface="Lato" panose="020F0502020204030203" pitchFamily="34" charset="0"/>
-              <a:sym typeface="Lato"/>
-            </a:endParaRPr>
-          </a:p>
-          <a:p>
-            <a:pPr marL="571500" indent="-571500" algn="just">
-              <a:buFont typeface="Wingdings" panose="05000000000000000000" pitchFamily="2" charset="2"/>
-              <a:buChar char="q"/>
-            </a:pPr>
-            <a:r>
-              <a:rPr lang="en-US" sz="3700" b="1" dirty="0">
-                <a:latin typeface="Constantia" panose="02030602050306030303" pitchFamily="18" charset="0"/>
-                <a:ea typeface="Lato" panose="020F0502020204030203" pitchFamily="34" charset="0"/>
-                <a:cs typeface="Lato" panose="020F0502020204030203" pitchFamily="34" charset="0"/>
-                <a:sym typeface="Lato"/>
-              </a:rPr>
-              <a:t>Do While:</a:t>
-            </a:r>
-          </a:p>
-          <a:p>
-            <a:pPr lvl="1" algn="just"/>
-            <a:r>
-              <a:rPr lang="en-US" sz="3700" dirty="0">
-                <a:latin typeface="Constantia" panose="02030602050306030303" pitchFamily="18" charset="0"/>
-              </a:rPr>
-              <a:t>Executes at least once, as the condition is checked after the loop body.</a:t>
-            </a:r>
-          </a:p>
-          <a:p>
-            <a:pPr lvl="1" algn="just"/>
-            <a:endParaRPr lang="en-US" sz="3700" dirty="0">
-              <a:latin typeface="Constantia" panose="02030602050306030303" pitchFamily="18" charset="0"/>
-            </a:endParaRPr>
-          </a:p>
-          <a:p>
-            <a:pPr marL="571500" indent="-571500" algn="just">
-              <a:buFont typeface="Wingdings" panose="05000000000000000000" pitchFamily="2" charset="2"/>
-              <a:buChar char="q"/>
-            </a:pPr>
-            <a:r>
-              <a:rPr lang="en-US" sz="3700" b="1" dirty="0">
-                <a:latin typeface="Constantia" panose="02030602050306030303" pitchFamily="18" charset="0"/>
-                <a:ea typeface="Lato" panose="020F0502020204030203" pitchFamily="34" charset="0"/>
-                <a:cs typeface="Lato" panose="020F0502020204030203" pitchFamily="34" charset="0"/>
-                <a:sym typeface="Lato"/>
-              </a:rPr>
-              <a:t>For Loop:</a:t>
-            </a:r>
-          </a:p>
-          <a:p>
-            <a:pPr lvl="1" algn="just"/>
-            <a:r>
-              <a:rPr lang="en-US" sz="3700" dirty="0">
-                <a:latin typeface="Constantia" panose="02030602050306030303" pitchFamily="18" charset="0"/>
-              </a:rPr>
-              <a:t>Designed for fixed number of iteration, with initialization, condition &amp; increment/decrement in single statement.</a:t>
-            </a:r>
-          </a:p>
-        </p:txBody>
-      </p:sp>
-    </p:spTree>
-    <p:extLst>
-      <p:ext uri="{BB962C8B-B14F-4D97-AF65-F5344CB8AC3E}">
-        <p14:creationId xmlns:p14="http://schemas.microsoft.com/office/powerpoint/2010/main" val="3853349485"/>
-      </p:ext>
-    </p:extLst>
-  </p:cSld>
-  <p:clrMapOvr>
-    <a:masterClrMapping/>
-  </p:clrMapOvr>
-  <p:timing>
-    <p:tnLst>
-      <p:par>
-        <p:cTn id="1" dur="indefinite" restart="never" nodeType="tmRoot">
-          <p:childTnLst>
-            <p:seq concurrent="1" nextAc="seek">
-              <p:cTn id="2" dur="indefinite" nodeType="mainSeq">
-                <p:childTnLst>
-                  <p:par>
-                    <p:cTn id="3" fill="hold">
-                      <p:stCondLst>
-                        <p:cond delay="indefinite"/>
-                      </p:stCondLst>
-                      <p:childTnLst>
-                        <p:par>
-                          <p:cTn id="4" fill="hold">
-                            <p:stCondLst>
-                              <p:cond delay="0"/>
-                            </p:stCondLst>
-                            <p:childTnLst>
-                              <p:par>
-                                <p:cTn id="5" presetID="2" presetClass="entr" presetSubtype="4" fill="hold" grpId="0" nodeType="clickEffect">
-                                  <p:stCondLst>
-                                    <p:cond delay="0"/>
-                                  </p:stCondLst>
-                                  <p:childTnLst>
-                                    <p:set>
-                                      <p:cBhvr>
-                                        <p:cTn id="6" dur="1" fill="hold">
-                                          <p:stCondLst>
-                                            <p:cond delay="0"/>
-                                          </p:stCondLst>
-                                        </p:cTn>
-                                        <p:tgtEl>
-                                          <p:spTgt spid="11">
-                                            <p:txEl>
-                                              <p:pRg st="0" end="0"/>
-                                            </p:txEl>
-                                          </p:spTgt>
-                                        </p:tgtEl>
-                                        <p:attrNameLst>
-                                          <p:attrName>style.visibility</p:attrName>
-                                        </p:attrNameLst>
-                                      </p:cBhvr>
-                                      <p:to>
-                                        <p:strVal val="visible"/>
-                                      </p:to>
-                                    </p:set>
-                                    <p:anim calcmode="lin" valueType="num">
-                                      <p:cBhvr additive="base">
-                                        <p:cTn id="7" dur="500" fill="hold"/>
-                                        <p:tgtEl>
-                                          <p:spTgt spid="11">
-                                            <p:txEl>
-                                              <p:pRg st="0" end="0"/>
-                                            </p:txEl>
-                                          </p:spTgt>
-                                        </p:tgtEl>
-                                        <p:attrNameLst>
-                                          <p:attrName>ppt_x</p:attrName>
-                                        </p:attrNameLst>
-                                      </p:cBhvr>
-                                      <p:tavLst>
-                                        <p:tav tm="0">
-                                          <p:val>
-                                            <p:strVal val="#ppt_x"/>
-                                          </p:val>
-                                        </p:tav>
-                                        <p:tav tm="100000">
-                                          <p:val>
-                                            <p:strVal val="#ppt_x"/>
-                                          </p:val>
-                                        </p:tav>
-                                      </p:tavLst>
-                                    </p:anim>
-                                    <p:anim calcmode="lin" valueType="num">
-                                      <p:cBhvr additive="base">
-                                        <p:cTn id="8" dur="500" fill="hold"/>
-                                        <p:tgtEl>
-                                          <p:spTgt spid="11">
-                                            <p:txEl>
-                                              <p:pRg st="0" end="0"/>
-                                            </p:txEl>
-                                          </p:spTgt>
-                                        </p:tgtEl>
-                                        <p:attrNameLst>
-                                          <p:attrName>ppt_y</p:attrName>
-                                        </p:attrNameLst>
-                                      </p:cBhvr>
-                                      <p:tavLst>
-                                        <p:tav tm="0">
-                                          <p:val>
-                                            <p:strVal val="1+#ppt_h/2"/>
-                                          </p:val>
-                                        </p:tav>
-                                        <p:tav tm="100000">
-                                          <p:val>
-                                            <p:strVal val="#ppt_y"/>
-                                          </p:val>
-                                        </p:tav>
-                                      </p:tavLst>
-                                    </p:anim>
-                                  </p:childTnLst>
-                                </p:cTn>
-                              </p:par>
-                              <p:par>
-                                <p:cTn id="9" presetID="2" presetClass="entr" presetSubtype="4" fill="hold" grpId="0" nodeType="withEffect">
-                                  <p:stCondLst>
-                                    <p:cond delay="0"/>
-                                  </p:stCondLst>
-                                  <p:childTnLst>
-                                    <p:set>
-                                      <p:cBhvr>
-                                        <p:cTn id="10" dur="1" fill="hold">
-                                          <p:stCondLst>
-                                            <p:cond delay="0"/>
-                                          </p:stCondLst>
-                                        </p:cTn>
-                                        <p:tgtEl>
-                                          <p:spTgt spid="11">
-                                            <p:txEl>
-                                              <p:pRg st="1" end="1"/>
-                                            </p:txEl>
-                                          </p:spTgt>
-                                        </p:tgtEl>
-                                        <p:attrNameLst>
-                                          <p:attrName>style.visibility</p:attrName>
-                                        </p:attrNameLst>
-                                      </p:cBhvr>
-                                      <p:to>
-                                        <p:strVal val="visible"/>
-                                      </p:to>
-                                    </p:set>
-                                    <p:anim calcmode="lin" valueType="num">
-                                      <p:cBhvr additive="base">
-                                        <p:cTn id="11" dur="500" fill="hold"/>
-                                        <p:tgtEl>
-                                          <p:spTgt spid="11">
-                                            <p:txEl>
-                                              <p:pRg st="1" end="1"/>
-                                            </p:txEl>
-                                          </p:spTgt>
-                                        </p:tgtEl>
-                                        <p:attrNameLst>
-                                          <p:attrName>ppt_x</p:attrName>
-                                        </p:attrNameLst>
-                                      </p:cBhvr>
-                                      <p:tavLst>
-                                        <p:tav tm="0">
-                                          <p:val>
-                                            <p:strVal val="#ppt_x"/>
-                                          </p:val>
-                                        </p:tav>
-                                        <p:tav tm="100000">
-                                          <p:val>
-                                            <p:strVal val="#ppt_x"/>
-                                          </p:val>
-                                        </p:tav>
-                                      </p:tavLst>
-                                    </p:anim>
-                                    <p:anim calcmode="lin" valueType="num">
-                                      <p:cBhvr additive="base">
-                                        <p:cTn id="12" dur="500" fill="hold"/>
-                                        <p:tgtEl>
-                                          <p:spTgt spid="11">
-                                            <p:txEl>
-                                              <p:pRg st="1" end="1"/>
-                                            </p:txEl>
-                                          </p:spTgt>
-                                        </p:tgtEl>
-                                        <p:attrNameLst>
-                                          <p:attrName>ppt_y</p:attrName>
-                                        </p:attrNameLst>
-                                      </p:cBhvr>
-                                      <p:tavLst>
-                                        <p:tav tm="0">
-                                          <p:val>
-                                            <p:strVal val="1+#ppt_h/2"/>
-                                          </p:val>
-                                        </p:tav>
-                                        <p:tav tm="100000">
-                                          <p:val>
-                                            <p:strVal val="#ppt_y"/>
-                                          </p:val>
-                                        </p:tav>
-                                      </p:tavLst>
-                                    </p:anim>
-                                  </p:childTnLst>
-                                </p:cTn>
-                              </p:par>
-                            </p:childTnLst>
-                          </p:cTn>
-                        </p:par>
-                      </p:childTnLst>
-                    </p:cTn>
-                  </p:par>
-                  <p:par>
-                    <p:cTn id="13" fill="hold">
-                      <p:stCondLst>
-                        <p:cond delay="indefinite"/>
-                      </p:stCondLst>
-                      <p:childTnLst>
-                        <p:par>
-                          <p:cTn id="14" fill="hold">
-                            <p:stCondLst>
-                              <p:cond delay="0"/>
-                            </p:stCondLst>
-                            <p:childTnLst>
-                              <p:par>
-                                <p:cTn id="15" presetID="2" presetClass="entr" presetSubtype="4" fill="hold" grpId="0" nodeType="clickEffect">
-                                  <p:stCondLst>
-                                    <p:cond delay="0"/>
-                                  </p:stCondLst>
-                                  <p:childTnLst>
-                                    <p:set>
-                                      <p:cBhvr>
-                                        <p:cTn id="16" dur="1" fill="hold">
-                                          <p:stCondLst>
-                                            <p:cond delay="0"/>
-                                          </p:stCondLst>
-                                        </p:cTn>
-                                        <p:tgtEl>
-                                          <p:spTgt spid="11">
-                                            <p:txEl>
-                                              <p:pRg st="3" end="3"/>
-                                            </p:txEl>
-                                          </p:spTgt>
-                                        </p:tgtEl>
-                                        <p:attrNameLst>
-                                          <p:attrName>style.visibility</p:attrName>
-                                        </p:attrNameLst>
-                                      </p:cBhvr>
-                                      <p:to>
-                                        <p:strVal val="visible"/>
-                                      </p:to>
-                                    </p:set>
-                                    <p:anim calcmode="lin" valueType="num">
-                                      <p:cBhvr additive="base">
-                                        <p:cTn id="17" dur="500" fill="hold"/>
-                                        <p:tgtEl>
-                                          <p:spTgt spid="11">
-                                            <p:txEl>
-                                              <p:pRg st="3" end="3"/>
-                                            </p:txEl>
-                                          </p:spTgt>
-                                        </p:tgtEl>
-                                        <p:attrNameLst>
-                                          <p:attrName>ppt_x</p:attrName>
-                                        </p:attrNameLst>
-                                      </p:cBhvr>
-                                      <p:tavLst>
-                                        <p:tav tm="0">
-                                          <p:val>
-                                            <p:strVal val="#ppt_x"/>
-                                          </p:val>
-                                        </p:tav>
-                                        <p:tav tm="100000">
-                                          <p:val>
-                                            <p:strVal val="#ppt_x"/>
-                                          </p:val>
-                                        </p:tav>
-                                      </p:tavLst>
-                                    </p:anim>
-                                    <p:anim calcmode="lin" valueType="num">
-                                      <p:cBhvr additive="base">
-                                        <p:cTn id="18" dur="500" fill="hold"/>
-                                        <p:tgtEl>
-                                          <p:spTgt spid="11">
-                                            <p:txEl>
-                                              <p:pRg st="3" end="3"/>
-                                            </p:txEl>
-                                          </p:spTgt>
-                                        </p:tgtEl>
-                                        <p:attrNameLst>
-                                          <p:attrName>ppt_y</p:attrName>
-                                        </p:attrNameLst>
-                                      </p:cBhvr>
-                                      <p:tavLst>
-                                        <p:tav tm="0">
-                                          <p:val>
-                                            <p:strVal val="1+#ppt_h/2"/>
-                                          </p:val>
-                                        </p:tav>
-                                        <p:tav tm="100000">
-                                          <p:val>
-                                            <p:strVal val="#ppt_y"/>
-                                          </p:val>
-                                        </p:tav>
-                                      </p:tavLst>
-                                    </p:anim>
-                                  </p:childTnLst>
-                                </p:cTn>
-                              </p:par>
-                            </p:childTnLst>
-                          </p:cTn>
-                        </p:par>
-                      </p:childTnLst>
-                    </p:cTn>
-                  </p:par>
-                </p:childTnLst>
-              </p:cTn>
-              <p:prevCondLst>
-                <p:cond evt="onPrev" delay="0">
-                  <p:tgtEl>
-                    <p:sldTgt/>
-                  </p:tgtEl>
-                </p:cond>
-              </p:prevCondLst>
-              <p:nextCondLst>
-                <p:cond evt="onNext" delay="0">
-                  <p:tgtEl>
-                    <p:sldTgt/>
-                  </p:tgtEl>
-                </p:cond>
-              </p:nextCondLst>
-            </p:seq>
-          </p:childTnLst>
-        </p:cTn>
-      </p:par>
-    </p:tnLst>
-    <p:bldLst>
-      <p:bldP spid="11" grpId="0" build="p"/>
-    </p:bldLst>
-  </p:timing>
-</p:sld>
-</file>
-
-<file path=ppt/slides/slide8.xml><?xml version="1.0" encoding="utf-8"?>
-<p:sld xmlns:a="http://schemas.openxmlformats.org/drawingml/2006/main" xmlns:r="http://schemas.openxmlformats.org/officeDocument/2006/relationships" xmlns:p="http://schemas.openxmlformats.org/presentationml/2006/main">
-  <p:cSld>
-    <p:spTree>
-      <p:nvGrpSpPr>
-        <p:cNvPr id="1" name="">
-          <a:extLst>
-            <a:ext uri="{FF2B5EF4-FFF2-40B4-BE49-F238E27FC236}">
               <a16:creationId xmlns:a16="http://schemas.microsoft.com/office/drawing/2014/main" id="{C4F3F26B-3B5C-B353-F96F-8971CFD46202}"/>
             </a:ext>
           </a:extLst>
@@ -9607,7 +8466,7 @@
         </p:blipFill>
         <p:spPr>
           <a:xfrm>
-            <a:off x="2937434" y="1254000"/>
+            <a:off x="3124200" y="1056399"/>
             <a:ext cx="9483166" cy="9055998"/>
           </a:xfrm>
           <a:prstGeom prst="rect">
@@ -9628,7 +8487,7 @@
 </p:sld>
 </file>
 
-<file path=ppt/slides/slide9.xml><?xml version="1.0" encoding="utf-8"?>
+<file path=ppt/slides/slide8.xml><?xml version="1.0" encoding="utf-8"?>
 <p:sld xmlns:a="http://schemas.openxmlformats.org/drawingml/2006/main" xmlns:r="http://schemas.openxmlformats.org/officeDocument/2006/relationships" xmlns:p="http://schemas.openxmlformats.org/presentationml/2006/main">
   <p:cSld>
     <p:spTree>
@@ -10302,6 +9161,419 @@
     </p:tnLst>
     <p:bldLst>
       <p:bldP spid="12" grpId="0" build="p"/>
+    </p:bldLst>
+  </p:timing>
+</p:sld>
+</file>
+
+<file path=ppt/slides/slide9.xml><?xml version="1.0" encoding="utf-8"?>
+<p:sld xmlns:a="http://schemas.openxmlformats.org/drawingml/2006/main" xmlns:r="http://schemas.openxmlformats.org/officeDocument/2006/relationships" xmlns:p="http://schemas.openxmlformats.org/presentationml/2006/main">
+  <p:cSld>
+    <p:spTree>
+      <p:nvGrpSpPr>
+        <p:cNvPr id="1" name=""/>
+        <p:cNvGrpSpPr/>
+        <p:nvPr/>
+      </p:nvGrpSpPr>
+      <p:grpSpPr>
+        <a:xfrm>
+          <a:off x="0" y="0"/>
+          <a:ext cx="0" cy="0"/>
+          <a:chOff x="0" y="0"/>
+          <a:chExt cx="0" cy="0"/>
+        </a:xfrm>
+      </p:grpSpPr>
+      <p:grpSp>
+        <p:nvGrpSpPr>
+          <p:cNvPr id="2" name="Group 2"/>
+          <p:cNvGrpSpPr/>
+          <p:nvPr/>
+        </p:nvGrpSpPr>
+        <p:grpSpPr>
+          <a:xfrm>
+            <a:off x="1588329" y="2113980"/>
+            <a:ext cx="2878700" cy="6059040"/>
+            <a:chOff x="0" y="0"/>
+            <a:chExt cx="758176" cy="1595797"/>
+          </a:xfrm>
+        </p:grpSpPr>
+        <p:sp>
+          <p:nvSpPr>
+            <p:cNvPr id="3" name="Freeform 3"/>
+            <p:cNvSpPr/>
+            <p:nvPr/>
+          </p:nvSpPr>
+          <p:spPr>
+            <a:xfrm>
+              <a:off x="0" y="0"/>
+              <a:ext cx="758176" cy="1595797"/>
+            </a:xfrm>
+            <a:custGeom>
+              <a:avLst/>
+              <a:gdLst/>
+              <a:ahLst/>
+              <a:cxnLst/>
+              <a:rect l="l" t="t" r="r" b="b"/>
+              <a:pathLst>
+                <a:path w="758176" h="1595797">
+                  <a:moveTo>
+                    <a:pt x="0" y="0"/>
+                  </a:moveTo>
+                  <a:lnTo>
+                    <a:pt x="758176" y="0"/>
+                  </a:lnTo>
+                  <a:lnTo>
+                    <a:pt x="758176" y="1595797"/>
+                  </a:lnTo>
+                  <a:lnTo>
+                    <a:pt x="0" y="1595797"/>
+                  </a:lnTo>
+                  <a:close/>
+                </a:path>
+              </a:pathLst>
+            </a:custGeom>
+            <a:solidFill>
+              <a:srgbClr val="FFC2CA"/>
+            </a:solidFill>
+          </p:spPr>
+        </p:sp>
+        <p:sp>
+          <p:nvSpPr>
+            <p:cNvPr id="4" name="TextBox 4"/>
+            <p:cNvSpPr txBox="1"/>
+            <p:nvPr/>
+          </p:nvSpPr>
+          <p:spPr>
+            <a:xfrm>
+              <a:off x="0" y="-38100"/>
+              <a:ext cx="758176" cy="1633897"/>
+            </a:xfrm>
+            <a:prstGeom prst="rect">
+              <a:avLst/>
+            </a:prstGeom>
+          </p:spPr>
+          <p:txBody>
+            <a:bodyPr lIns="50800" tIns="50800" rIns="50800" bIns="50800" rtlCol="0" anchor="ctr"/>
+            <a:lstStyle/>
+            <a:p>
+              <a:pPr algn="ctr">
+                <a:lnSpc>
+                  <a:spcPts val="2659"/>
+                </a:lnSpc>
+              </a:pPr>
+              <a:endParaRPr/>
+            </a:p>
+          </p:txBody>
+        </p:sp>
+      </p:grpSp>
+      <p:sp>
+        <p:nvSpPr>
+          <p:cNvPr id="5" name="TextBox 5"/>
+          <p:cNvSpPr txBox="1"/>
+          <p:nvPr/>
+        </p:nvSpPr>
+        <p:spPr>
+          <a:xfrm>
+            <a:off x="3724086" y="3883258"/>
+            <a:ext cx="7653319" cy="1708154"/>
+          </a:xfrm>
+          <a:prstGeom prst="rect">
+            <a:avLst/>
+          </a:prstGeom>
+        </p:spPr>
+        <p:txBody>
+          <a:bodyPr lIns="0" tIns="0" rIns="0" bIns="0" rtlCol="0" anchor="t">
+            <a:spAutoFit/>
+          </a:bodyPr>
+          <a:lstStyle/>
+          <a:p>
+            <a:pPr algn="l">
+              <a:lnSpc>
+                <a:spcPts val="13999"/>
+              </a:lnSpc>
+            </a:pPr>
+            <a:r>
+              <a:rPr lang="en-US" sz="9999" b="1" u="sng" dirty="0">
+                <a:solidFill>
+                  <a:srgbClr val="2E2E2E"/>
+                </a:solidFill>
+                <a:latin typeface="Lato Bold"/>
+                <a:ea typeface="Lato Bold"/>
+                <a:cs typeface="Lato Bold"/>
+                <a:sym typeface="Lato Bold"/>
+              </a:rPr>
+              <a:t>Thank You</a:t>
+            </a:r>
+          </a:p>
+        </p:txBody>
+      </p:sp>
+      <p:grpSp>
+        <p:nvGrpSpPr>
+          <p:cNvPr id="6" name="Group 6"/>
+          <p:cNvGrpSpPr/>
+          <p:nvPr/>
+        </p:nvGrpSpPr>
+        <p:grpSpPr>
+          <a:xfrm>
+            <a:off x="17259300" y="3803885"/>
+            <a:ext cx="1028700" cy="5454415"/>
+            <a:chOff x="0" y="0"/>
+            <a:chExt cx="270933" cy="1436554"/>
+          </a:xfrm>
+        </p:grpSpPr>
+        <p:sp>
+          <p:nvSpPr>
+            <p:cNvPr id="7" name="Freeform 7"/>
+            <p:cNvSpPr/>
+            <p:nvPr/>
+          </p:nvSpPr>
+          <p:spPr>
+            <a:xfrm>
+              <a:off x="0" y="0"/>
+              <a:ext cx="270933" cy="1436554"/>
+            </a:xfrm>
+            <a:custGeom>
+              <a:avLst/>
+              <a:gdLst/>
+              <a:ahLst/>
+              <a:cxnLst/>
+              <a:rect l="l" t="t" r="r" b="b"/>
+              <a:pathLst>
+                <a:path w="270933" h="1436554">
+                  <a:moveTo>
+                    <a:pt x="0" y="0"/>
+                  </a:moveTo>
+                  <a:lnTo>
+                    <a:pt x="270933" y="0"/>
+                  </a:lnTo>
+                  <a:lnTo>
+                    <a:pt x="270933" y="1436554"/>
+                  </a:lnTo>
+                  <a:lnTo>
+                    <a:pt x="0" y="1436554"/>
+                  </a:lnTo>
+                  <a:close/>
+                </a:path>
+              </a:pathLst>
+            </a:custGeom>
+            <a:solidFill>
+              <a:srgbClr val="FFC2CA"/>
+            </a:solidFill>
+          </p:spPr>
+        </p:sp>
+        <p:sp>
+          <p:nvSpPr>
+            <p:cNvPr id="8" name="TextBox 8"/>
+            <p:cNvSpPr txBox="1"/>
+            <p:nvPr/>
+          </p:nvSpPr>
+          <p:spPr>
+            <a:xfrm>
+              <a:off x="0" y="-38100"/>
+              <a:ext cx="270933" cy="1474654"/>
+            </a:xfrm>
+            <a:prstGeom prst="rect">
+              <a:avLst/>
+            </a:prstGeom>
+          </p:spPr>
+          <p:txBody>
+            <a:bodyPr lIns="50800" tIns="50800" rIns="50800" bIns="50800" rtlCol="0" anchor="ctr"/>
+            <a:lstStyle/>
+            <a:p>
+              <a:pPr algn="ctr">
+                <a:lnSpc>
+                  <a:spcPts val="2659"/>
+                </a:lnSpc>
+              </a:pPr>
+              <a:endParaRPr/>
+            </a:p>
+          </p:txBody>
+        </p:sp>
+      </p:grpSp>
+      <p:sp>
+        <p:nvSpPr>
+          <p:cNvPr id="10" name="TextBox 10"/>
+          <p:cNvSpPr txBox="1"/>
+          <p:nvPr/>
+        </p:nvSpPr>
+        <p:spPr>
+          <a:xfrm>
+            <a:off x="5320274" y="3756260"/>
+            <a:ext cx="3536394" cy="336311"/>
+          </a:xfrm>
+          <a:prstGeom prst="rect">
+            <a:avLst/>
+          </a:prstGeom>
+        </p:spPr>
+        <p:txBody>
+          <a:bodyPr lIns="0" tIns="0" rIns="0" bIns="0" rtlCol="0" anchor="t">
+            <a:spAutoFit/>
+          </a:bodyPr>
+          <a:lstStyle/>
+          <a:p>
+            <a:pPr algn="l">
+              <a:lnSpc>
+                <a:spcPts val="2940"/>
+              </a:lnSpc>
+            </a:pPr>
+            <a:r>
+              <a:rPr lang="en-US" sz="2100" b="1" dirty="0">
+                <a:solidFill>
+                  <a:srgbClr val="796292"/>
+                </a:solidFill>
+                <a:latin typeface="Lato Bold"/>
+                <a:ea typeface="Lato Bold"/>
+                <a:cs typeface="Lato Bold"/>
+                <a:sym typeface="Lato Bold"/>
+              </a:rPr>
+              <a:t>Lecture Completed!</a:t>
+            </a:r>
+          </a:p>
+        </p:txBody>
+      </p:sp>
+    </p:spTree>
+  </p:cSld>
+  <p:clrMapOvr>
+    <a:masterClrMapping/>
+  </p:clrMapOvr>
+  <p:timing>
+    <p:tnLst>
+      <p:par>
+        <p:cTn id="1" dur="indefinite" restart="never" nodeType="tmRoot">
+          <p:childTnLst>
+            <p:seq concurrent="1" nextAc="seek">
+              <p:cTn id="2" dur="indefinite" nodeType="mainSeq">
+                <p:childTnLst>
+                  <p:par>
+                    <p:cTn id="3" fill="hold">
+                      <p:stCondLst>
+                        <p:cond delay="indefinite"/>
+                      </p:stCondLst>
+                      <p:childTnLst>
+                        <p:par>
+                          <p:cTn id="4" fill="hold">
+                            <p:stCondLst>
+                              <p:cond delay="0"/>
+                            </p:stCondLst>
+                            <p:childTnLst>
+                              <p:par>
+                                <p:cTn id="5" presetID="22" presetClass="entr" presetSubtype="4" fill="hold" grpId="0" nodeType="clickEffect">
+                                  <p:stCondLst>
+                                    <p:cond delay="0"/>
+                                  </p:stCondLst>
+                                  <p:childTnLst>
+                                    <p:set>
+                                      <p:cBhvr>
+                                        <p:cTn id="6" dur="1" fill="hold">
+                                          <p:stCondLst>
+                                            <p:cond delay="0"/>
+                                          </p:stCondLst>
+                                        </p:cTn>
+                                        <p:tgtEl>
+                                          <p:spTgt spid="10"/>
+                                        </p:tgtEl>
+                                        <p:attrNameLst>
+                                          <p:attrName>style.visibility</p:attrName>
+                                        </p:attrNameLst>
+                                      </p:cBhvr>
+                                      <p:to>
+                                        <p:strVal val="visible"/>
+                                      </p:to>
+                                    </p:set>
+                                    <p:animEffect transition="in" filter="wipe(down)">
+                                      <p:cBhvr>
+                                        <p:cTn id="7" dur="500"/>
+                                        <p:tgtEl>
+                                          <p:spTgt spid="10"/>
+                                        </p:tgtEl>
+                                      </p:cBhvr>
+                                    </p:animEffect>
+                                  </p:childTnLst>
+                                </p:cTn>
+                              </p:par>
+                            </p:childTnLst>
+                          </p:cTn>
+                        </p:par>
+                      </p:childTnLst>
+                    </p:cTn>
+                  </p:par>
+                  <p:par>
+                    <p:cTn id="8" fill="hold">
+                      <p:stCondLst>
+                        <p:cond delay="indefinite"/>
+                      </p:stCondLst>
+                      <p:childTnLst>
+                        <p:par>
+                          <p:cTn id="9" fill="hold">
+                            <p:stCondLst>
+                              <p:cond delay="0"/>
+                            </p:stCondLst>
+                            <p:childTnLst>
+                              <p:par>
+                                <p:cTn id="10" presetID="22" presetClass="entr" presetSubtype="4" fill="hold" grpId="0" nodeType="clickEffect">
+                                  <p:stCondLst>
+                                    <p:cond delay="0"/>
+                                  </p:stCondLst>
+                                  <p:childTnLst>
+                                    <p:set>
+                                      <p:cBhvr>
+                                        <p:cTn id="11" dur="1" fill="hold">
+                                          <p:stCondLst>
+                                            <p:cond delay="0"/>
+                                          </p:stCondLst>
+                                        </p:cTn>
+                                        <p:tgtEl>
+                                          <p:spTgt spid="5"/>
+                                        </p:tgtEl>
+                                        <p:attrNameLst>
+                                          <p:attrName>style.visibility</p:attrName>
+                                        </p:attrNameLst>
+                                      </p:cBhvr>
+                                      <p:to>
+                                        <p:strVal val="visible"/>
+                                      </p:to>
+                                    </p:set>
+                                    <p:animEffect transition="in" filter="wipe(down)">
+                                      <p:cBhvr>
+                                        <p:cTn id="12" dur="500"/>
+                                        <p:tgtEl>
+                                          <p:spTgt spid="5"/>
+                                        </p:tgtEl>
+                                      </p:cBhvr>
+                                    </p:animEffect>
+                                  </p:childTnLst>
+                                </p:cTn>
+                              </p:par>
+                            </p:childTnLst>
+                          </p:cTn>
+                        </p:par>
+                      </p:childTnLst>
+                    </p:cTn>
+                  </p:par>
+                </p:childTnLst>
+              </p:cTn>
+              <p:prevCondLst>
+                <p:cond evt="onPrev" delay="0">
+                  <p:tgtEl>
+                    <p:sldTgt/>
+                  </p:tgtEl>
+                </p:cond>
+              </p:prevCondLst>
+              <p:nextCondLst>
+                <p:cond evt="onNext" delay="0">
+                  <p:tgtEl>
+                    <p:sldTgt/>
+                  </p:tgtEl>
+                </p:cond>
+              </p:nextCondLst>
+            </p:seq>
+          </p:childTnLst>
+        </p:cTn>
+      </p:par>
+    </p:tnLst>
+    <p:bldLst>
+      <p:bldP spid="5" grpId="0"/>
+      <p:bldP spid="10" grpId="0"/>
     </p:bldLst>
   </p:timing>
 </p:sld>

</xml_diff>